<commit_message>
Fix the plan in the summary slide
</commit_message>
<xml_diff>
--- a/documents/slides/Project_Summary_20180816.pptx
+++ b/documents/slides/Project_Summary_20180816.pptx
@@ -270,7 +270,7 @@
             <a:fld id="{EA3D68A3-9B80-584C-9BEB-F8B43CF5A651}" type="datetime1">
               <a:rPr lang="en-US" sz="900" smtClean="0"/>
               <a:pPr/>
-              <a:t>8/16/2018</a:t>
+              <a:t>8/26/2018</a:t>
             </a:fld>
             <a:endParaRPr lang="en-US" sz="900"/>
           </a:p>
@@ -441,7 +441,7 @@
             <a:fld id="{39FEAFF0-7375-1D4A-A389-D6238357B121}" type="datetime1">
               <a:rPr lang="en-US" smtClean="0"/>
               <a:pPr/>
-              <a:t>8/16/2018</a:t>
+              <a:t>8/26/2018</a:t>
             </a:fld>
             <a:endParaRPr lang="en-US"/>
           </a:p>
@@ -800,7 +800,7 @@
             <a:fld id="{39FEAFF0-7375-1D4A-A389-D6238357B121}" type="datetime1">
               <a:rPr lang="en-US" smtClean="0"/>
               <a:pPr/>
-              <a:t>8/16/2018</a:t>
+              <a:t>8/26/2018</a:t>
             </a:fld>
             <a:endParaRPr lang="en-US"/>
           </a:p>
@@ -931,7 +931,7 @@
             <a:fld id="{39FEAFF0-7375-1D4A-A389-D6238357B121}" type="datetime1">
               <a:rPr lang="en-US" smtClean="0"/>
               <a:pPr/>
-              <a:t>8/16/2018</a:t>
+              <a:t>8/26/2018</a:t>
             </a:fld>
             <a:endParaRPr lang="en-US"/>
           </a:p>
@@ -1246,7 +1246,7 @@
             <a:fld id="{39FEAFF0-7375-1D4A-A389-D6238357B121}" type="datetime1">
               <a:rPr lang="en-US" smtClean="0"/>
               <a:pPr/>
-              <a:t>8/16/2018</a:t>
+              <a:t>8/26/2018</a:t>
             </a:fld>
             <a:endParaRPr lang="en-US"/>
           </a:p>
@@ -1377,7 +1377,7 @@
             <a:fld id="{39FEAFF0-7375-1D4A-A389-D6238357B121}" type="datetime1">
               <a:rPr lang="en-US" smtClean="0"/>
               <a:pPr/>
-              <a:t>8/16/2018</a:t>
+              <a:t>8/26/2018</a:t>
             </a:fld>
             <a:endParaRPr lang="en-US"/>
           </a:p>
@@ -1604,7 +1604,7 @@
             <a:fld id="{39FEAFF0-7375-1D4A-A389-D6238357B121}" type="datetime1">
               <a:rPr lang="en-US" smtClean="0"/>
               <a:pPr/>
-              <a:t>8/16/2018</a:t>
+              <a:t>8/26/2018</a:t>
             </a:fld>
             <a:endParaRPr lang="en-US"/>
           </a:p>
@@ -1735,7 +1735,7 @@
             <a:fld id="{39FEAFF0-7375-1D4A-A389-D6238357B121}" type="datetime1">
               <a:rPr lang="en-US" smtClean="0"/>
               <a:pPr/>
-              <a:t>8/16/2018</a:t>
+              <a:t>8/26/2018</a:t>
             </a:fld>
             <a:endParaRPr lang="en-US"/>
           </a:p>
@@ -1822,6 +1822,10 @@
           <a:bodyPr/>
           <a:lstStyle/>
           <a:p>
+            <a:r>
+              <a:rPr lang="en-US" smtClean="0"/>
+              <a:t>https://github.com/NERSC/DL-Parallel-IO</a:t>
+            </a:r>
             <a:endParaRPr lang="en-US" dirty="0"/>
           </a:p>
         </p:txBody>
@@ -1866,7 +1870,7 @@
             <a:fld id="{39FEAFF0-7375-1D4A-A389-D6238357B121}" type="datetime1">
               <a:rPr lang="en-US" smtClean="0"/>
               <a:pPr/>
-              <a:t>8/16/2018</a:t>
+              <a:t>8/26/2018</a:t>
             </a:fld>
             <a:endParaRPr lang="en-US"/>
           </a:p>
@@ -2090,7 +2094,7 @@
             <a:fld id="{39FEAFF0-7375-1D4A-A389-D6238357B121}" type="datetime1">
               <a:rPr lang="en-US" smtClean="0"/>
               <a:pPr/>
-              <a:t>8/16/2018</a:t>
+              <a:t>8/26/2018</a:t>
             </a:fld>
             <a:endParaRPr lang="en-US"/>
           </a:p>
@@ -2221,7 +2225,7 @@
             <a:fld id="{39FEAFF0-7375-1D4A-A389-D6238357B121}" type="datetime1">
               <a:rPr lang="en-US" smtClean="0"/>
               <a:pPr/>
-              <a:t>8/16/2018</a:t>
+              <a:t>8/26/2018</a:t>
             </a:fld>
             <a:endParaRPr lang="en-US"/>
           </a:p>
@@ -2437,7 +2441,7 @@
             <a:fld id="{39FEAFF0-7375-1D4A-A389-D6238357B121}" type="datetime1">
               <a:rPr lang="en-US" smtClean="0"/>
               <a:pPr/>
-              <a:t>8/16/2018</a:t>
+              <a:t>8/26/2018</a:t>
             </a:fld>
             <a:endParaRPr lang="en-US"/>
           </a:p>
@@ -2656,7 +2660,7 @@
             <a:fld id="{39FEAFF0-7375-1D4A-A389-D6238357B121}" type="datetime1">
               <a:rPr lang="en-US" smtClean="0"/>
               <a:pPr/>
-              <a:t>8/16/2018</a:t>
+              <a:t>8/26/2018</a:t>
             </a:fld>
             <a:endParaRPr lang="en-US"/>
           </a:p>
@@ -3324,7 +3328,7 @@
             <a:fld id="{D897A66F-DFB6-CB44-8B31-7FAB7C20B0C7}" type="datetime4">
               <a:rPr lang="en-US" smtClean="0"/>
               <a:pPr/>
-              <a:t>August 16, 2018</a:t>
+              <a:t>August 26, 2018</a:t>
             </a:fld>
             <a:endParaRPr lang="en-US" dirty="0"/>
           </a:p>
@@ -10505,7 +10509,25 @@
               <a:rPr lang="en-US" sz="1800" b="0" dirty="0">
                 <a:cs typeface="Avenir Book"/>
               </a:rPr>
-              <a:t>target at least a workshop publication</a:t>
+              <a:t>target </a:t>
+            </a:r>
+            <a:r>
+              <a:rPr lang="en-US" sz="1800" b="0" smtClean="0">
+                <a:cs typeface="Avenir Book"/>
+              </a:rPr>
+              <a:t>a conference</a:t>
+            </a:r>
+            <a:r>
+              <a:rPr lang="en-US" sz="1800" b="0" smtClean="0">
+                <a:cs typeface="Avenir Book"/>
+              </a:rPr>
+              <a:t> </a:t>
+            </a:r>
+            <a:r>
+              <a:rPr lang="en-US" sz="1800" b="0" dirty="0">
+                <a:cs typeface="Avenir Book"/>
+              </a:rPr>
+              <a:t>publication</a:t>
             </a:r>
           </a:p>
         </p:txBody>

</xml_diff>